<commit_message>
Edited Model Component class diagram
</commit_message>
<xml_diff>
--- a/docs/diagrams/ModelComponentClassDiagram.pptx
+++ b/docs/diagrams/ModelComponentClassDiagram.pptx
@@ -208,7 +208,7 @@
           <a:p>
             <a:fld id="{F5CC4B3F-88C1-4FFA-B1B6-F41C21DC6924}" type="datetimeFigureOut">
               <a:rPr lang="en-US" smtClean="0"/>
-              <a:t>6/27/2018</a:t>
+              <a:t>10/18/2018</a:t>
             </a:fld>
             <a:endParaRPr lang="en-US"/>
           </a:p>
@@ -654,7 +654,7 @@
           <a:p>
             <a:fld id="{78C97017-6FC3-485B-9764-EAC9E56C1D49}" type="datetimeFigureOut">
               <a:rPr lang="en-US" smtClean="0"/>
-              <a:t>6/27/2018</a:t>
+              <a:t>10/18/2018</a:t>
             </a:fld>
             <a:endParaRPr lang="en-US"/>
           </a:p>
@@ -822,7 +822,7 @@
           <a:p>
             <a:fld id="{78C97017-6FC3-485B-9764-EAC9E56C1D49}" type="datetimeFigureOut">
               <a:rPr lang="en-US" smtClean="0"/>
-              <a:t>6/27/2018</a:t>
+              <a:t>10/18/2018</a:t>
             </a:fld>
             <a:endParaRPr lang="en-US"/>
           </a:p>
@@ -1000,7 +1000,7 @@
           <a:p>
             <a:fld id="{78C97017-6FC3-485B-9764-EAC9E56C1D49}" type="datetimeFigureOut">
               <a:rPr lang="en-US" smtClean="0"/>
-              <a:t>6/27/2018</a:t>
+              <a:t>10/18/2018</a:t>
             </a:fld>
             <a:endParaRPr lang="en-US"/>
           </a:p>
@@ -1168,7 +1168,7 @@
           <a:p>
             <a:fld id="{78C97017-6FC3-485B-9764-EAC9E56C1D49}" type="datetimeFigureOut">
               <a:rPr lang="en-US" smtClean="0"/>
-              <a:t>6/27/2018</a:t>
+              <a:t>10/18/2018</a:t>
             </a:fld>
             <a:endParaRPr lang="en-US"/>
           </a:p>
@@ -1413,7 +1413,7 @@
           <a:p>
             <a:fld id="{78C97017-6FC3-485B-9764-EAC9E56C1D49}" type="datetimeFigureOut">
               <a:rPr lang="en-US" smtClean="0"/>
-              <a:t>6/27/2018</a:t>
+              <a:t>10/18/2018</a:t>
             </a:fld>
             <a:endParaRPr lang="en-US"/>
           </a:p>
@@ -1698,7 +1698,7 @@
           <a:p>
             <a:fld id="{78C97017-6FC3-485B-9764-EAC9E56C1D49}" type="datetimeFigureOut">
               <a:rPr lang="en-US" smtClean="0"/>
-              <a:t>6/27/2018</a:t>
+              <a:t>10/18/2018</a:t>
             </a:fld>
             <a:endParaRPr lang="en-US"/>
           </a:p>
@@ -2117,7 +2117,7 @@
           <a:p>
             <a:fld id="{78C97017-6FC3-485B-9764-EAC9E56C1D49}" type="datetimeFigureOut">
               <a:rPr lang="en-US" smtClean="0"/>
-              <a:t>6/27/2018</a:t>
+              <a:t>10/18/2018</a:t>
             </a:fld>
             <a:endParaRPr lang="en-US"/>
           </a:p>
@@ -2234,7 +2234,7 @@
           <a:p>
             <a:fld id="{78C97017-6FC3-485B-9764-EAC9E56C1D49}" type="datetimeFigureOut">
               <a:rPr lang="en-US" smtClean="0"/>
-              <a:t>6/27/2018</a:t>
+              <a:t>10/18/2018</a:t>
             </a:fld>
             <a:endParaRPr lang="en-US"/>
           </a:p>
@@ -2329,7 +2329,7 @@
           <a:p>
             <a:fld id="{78C97017-6FC3-485B-9764-EAC9E56C1D49}" type="datetimeFigureOut">
               <a:rPr lang="en-US" smtClean="0"/>
-              <a:t>6/27/2018</a:t>
+              <a:t>10/18/2018</a:t>
             </a:fld>
             <a:endParaRPr lang="en-US"/>
           </a:p>
@@ -2604,7 +2604,7 @@
           <a:p>
             <a:fld id="{78C97017-6FC3-485B-9764-EAC9E56C1D49}" type="datetimeFigureOut">
               <a:rPr lang="en-US" smtClean="0"/>
-              <a:t>6/27/2018</a:t>
+              <a:t>10/18/2018</a:t>
             </a:fld>
             <a:endParaRPr lang="en-US"/>
           </a:p>
@@ -2856,7 +2856,7 @@
           <a:p>
             <a:fld id="{78C97017-6FC3-485B-9764-EAC9E56C1D49}" type="datetimeFigureOut">
               <a:rPr lang="en-US" smtClean="0"/>
-              <a:t>6/27/2018</a:t>
+              <a:t>10/18/2018</a:t>
             </a:fld>
             <a:endParaRPr lang="en-US"/>
           </a:p>
@@ -3067,7 +3067,7 @@
           <a:p>
             <a:fld id="{78C97017-6FC3-485B-9764-EAC9E56C1D49}" type="datetimeFigureOut">
               <a:rPr lang="en-US" smtClean="0"/>
-              <a:t>6/27/2018</a:t>
+              <a:t>10/18/2018</a:t>
             </a:fld>
             <a:endParaRPr lang="en-US"/>
           </a:p>
@@ -3994,7 +3994,7 @@
           <a:p>
             <a:pPr algn="ctr"/>
             <a:r>
-              <a:rPr lang="en-US" sz="1050" dirty="0" err="1" smtClean="0">
+              <a:rPr lang="en-US" sz="1050" dirty="0" err="1">
                 <a:solidFill>
                   <a:srgbClr val="7030A0"/>
                 </a:solidFill>
@@ -5023,14 +5023,6 @@
               </a:rPr>
               <a:t>&lt;&lt;interface&gt;&gt;</a:t>
             </a:r>
-            <a:r>
-              <a:rPr lang="en-US" sz="1050">
-                <a:solidFill>
-                  <a:srgbClr val="7030A0"/>
-                </a:solidFill>
-              </a:rPr>
-              <a:t/>
-            </a:r>
             <a:br>
               <a:rPr lang="en-US" sz="1050">
                 <a:solidFill>
@@ -5641,6 +5633,623 @@
           </a:fontRef>
         </p:style>
       </p:cxnSp>
+      <p:sp>
+        <p:nvSpPr>
+          <p:cNvPr id="56" name="Flowchart: Decision 96">
+            <a:extLst>
+              <a:ext uri="{FF2B5EF4-FFF2-40B4-BE49-F238E27FC236}">
+                <a16:creationId xmlns:a16="http://schemas.microsoft.com/office/drawing/2014/main" id="{F6FEDA25-F713-4DEF-8E6E-3832BD230724}"/>
+              </a:ext>
+            </a:extLst>
+          </p:cNvPr>
+          <p:cNvSpPr/>
+          <p:nvPr/>
+        </p:nvSpPr>
+        <p:spPr>
+          <a:xfrm rot="5400000">
+            <a:off x="3550759" y="3514788"/>
+            <a:ext cx="236048" cy="173380"/>
+          </a:xfrm>
+          <a:prstGeom prst="flowChartDecision">
+            <a:avLst/>
+          </a:prstGeom>
+          <a:solidFill>
+            <a:srgbClr val="7030A0"/>
+          </a:solidFill>
+          <a:ln w="19050">
+            <a:solidFill>
+              <a:srgbClr val="7030A0"/>
+            </a:solidFill>
+          </a:ln>
+          <a:effectLst/>
+        </p:spPr>
+        <p:style>
+          <a:lnRef idx="1">
+            <a:schemeClr val="accent6"/>
+          </a:lnRef>
+          <a:fillRef idx="2">
+            <a:schemeClr val="accent6"/>
+          </a:fillRef>
+          <a:effectRef idx="1">
+            <a:schemeClr val="accent6"/>
+          </a:effectRef>
+          <a:fontRef idx="minor">
+            <a:schemeClr val="dk1"/>
+          </a:fontRef>
+        </p:style>
+        <p:txBody>
+          <a:bodyPr rtlCol="0" anchor="ctr"/>
+          <a:lstStyle/>
+          <a:p>
+            <a:pPr algn="ctr"/>
+            <a:endParaRPr lang="en-US" sz="1050"/>
+          </a:p>
+        </p:txBody>
+      </p:sp>
+      <p:cxnSp>
+        <p:nvCxnSpPr>
+          <p:cNvPr id="57" name="Connector: Elbow 56">
+            <a:extLst>
+              <a:ext uri="{FF2B5EF4-FFF2-40B4-BE49-F238E27FC236}">
+                <a16:creationId xmlns:a16="http://schemas.microsoft.com/office/drawing/2014/main" id="{7802B7BF-424D-41F1-B34D-C73184E365DE}"/>
+              </a:ext>
+            </a:extLst>
+          </p:cNvPr>
+          <p:cNvCxnSpPr>
+            <a:cxnSpLocks/>
+            <a:stCxn id="82" idx="1"/>
+            <a:endCxn id="59" idx="2"/>
+          </p:cNvCxnSpPr>
+          <p:nvPr/>
+        </p:nvCxnSpPr>
+        <p:spPr>
+          <a:xfrm rot="5400000" flipH="1" flipV="1">
+            <a:off x="4507462" y="2137229"/>
+            <a:ext cx="184290" cy="718847"/>
+          </a:xfrm>
+          <a:prstGeom prst="bentConnector3">
+            <a:avLst>
+              <a:gd name="adj1" fmla="val 50000"/>
+            </a:avLst>
+          </a:prstGeom>
+          <a:ln w="19050" cap="flat" cmpd="sng" algn="ctr">
+            <a:solidFill>
+              <a:srgbClr val="7030A0"/>
+            </a:solidFill>
+            <a:prstDash val="solid"/>
+            <a:round/>
+            <a:headEnd type="none" w="med" len="med"/>
+            <a:tailEnd type="arrow" w="med" len="med"/>
+          </a:ln>
+        </p:spPr>
+        <p:style>
+          <a:lnRef idx="0">
+            <a:scrgbClr r="0" g="0" b="0"/>
+          </a:lnRef>
+          <a:fillRef idx="0">
+            <a:scrgbClr r="0" g="0" b="0"/>
+          </a:fillRef>
+          <a:effectRef idx="0">
+            <a:scrgbClr r="0" g="0" b="0"/>
+          </a:effectRef>
+          <a:fontRef idx="minor">
+            <a:schemeClr val="tx1"/>
+          </a:fontRef>
+        </p:style>
+      </p:cxnSp>
+      <p:sp>
+        <p:nvSpPr>
+          <p:cNvPr id="59" name="Rectangle 8">
+            <a:extLst>
+              <a:ext uri="{FF2B5EF4-FFF2-40B4-BE49-F238E27FC236}">
+                <a16:creationId xmlns:a16="http://schemas.microsoft.com/office/drawing/2014/main" id="{D197349A-4A2A-4198-A539-588890CAAC6E}"/>
+              </a:ext>
+            </a:extLst>
+          </p:cNvPr>
+          <p:cNvSpPr/>
+          <p:nvPr/>
+        </p:nvSpPr>
+        <p:spPr>
+          <a:xfrm>
+            <a:off x="4380546" y="2057747"/>
+            <a:ext cx="1156969" cy="346760"/>
+          </a:xfrm>
+          <a:prstGeom prst="rect">
+            <a:avLst/>
+          </a:prstGeom>
+          <a:ln w="19050">
+            <a:solidFill>
+              <a:srgbClr val="7030A0"/>
+            </a:solidFill>
+          </a:ln>
+          <a:effectLst/>
+        </p:spPr>
+        <p:style>
+          <a:lnRef idx="1">
+            <a:schemeClr val="accent4"/>
+          </a:lnRef>
+          <a:fillRef idx="2">
+            <a:schemeClr val="accent4"/>
+          </a:fillRef>
+          <a:effectRef idx="1">
+            <a:schemeClr val="accent4"/>
+          </a:effectRef>
+          <a:fontRef idx="minor">
+            <a:schemeClr val="dk1"/>
+          </a:fontRef>
+        </p:style>
+        <p:txBody>
+          <a:bodyPr rtlCol="0" anchor="ctr"/>
+          <a:lstStyle/>
+          <a:p>
+            <a:pPr algn="ctr"/>
+            <a:r>
+              <a:rPr lang="en-US" sz="1050" dirty="0">
+                <a:solidFill>
+                  <a:srgbClr val="7030A0"/>
+                </a:solidFill>
+              </a:rPr>
+              <a:t>Event</a:t>
+            </a:r>
+            <a:endParaRPr lang="en-SG" sz="1050" dirty="0">
+              <a:solidFill>
+                <a:srgbClr val="7030A0"/>
+              </a:solidFill>
+            </a:endParaRPr>
+          </a:p>
+        </p:txBody>
+      </p:sp>
+      <p:sp>
+        <p:nvSpPr>
+          <p:cNvPr id="67" name="Flowchart: Decision 96">
+            <a:extLst>
+              <a:ext uri="{FF2B5EF4-FFF2-40B4-BE49-F238E27FC236}">
+                <a16:creationId xmlns:a16="http://schemas.microsoft.com/office/drawing/2014/main" id="{6847627A-81A5-4DC4-A7CD-461C158FCFE5}"/>
+              </a:ext>
+            </a:extLst>
+          </p:cNvPr>
+          <p:cNvSpPr/>
+          <p:nvPr/>
+        </p:nvSpPr>
+        <p:spPr>
+          <a:xfrm>
+            <a:off x="5550632" y="2139270"/>
+            <a:ext cx="236048" cy="173380"/>
+          </a:xfrm>
+          <a:prstGeom prst="flowChartDecision">
+            <a:avLst/>
+          </a:prstGeom>
+          <a:solidFill>
+            <a:srgbClr val="7030A0"/>
+          </a:solidFill>
+          <a:ln w="19050">
+            <a:solidFill>
+              <a:srgbClr val="7030A0"/>
+            </a:solidFill>
+          </a:ln>
+          <a:effectLst/>
+        </p:spPr>
+        <p:style>
+          <a:lnRef idx="1">
+            <a:schemeClr val="accent6"/>
+          </a:lnRef>
+          <a:fillRef idx="2">
+            <a:schemeClr val="accent6"/>
+          </a:fillRef>
+          <a:effectRef idx="1">
+            <a:schemeClr val="accent6"/>
+          </a:effectRef>
+          <a:fontRef idx="minor">
+            <a:schemeClr val="dk1"/>
+          </a:fontRef>
+        </p:style>
+        <p:txBody>
+          <a:bodyPr rtlCol="0" anchor="ctr"/>
+          <a:lstStyle/>
+          <a:p>
+            <a:pPr algn="ctr"/>
+            <a:endParaRPr lang="en-US" sz="1050"/>
+          </a:p>
+        </p:txBody>
+      </p:sp>
+      <p:cxnSp>
+        <p:nvCxnSpPr>
+          <p:cNvPr id="71" name="Elbow Connector 78">
+            <a:extLst>
+              <a:ext uri="{FF2B5EF4-FFF2-40B4-BE49-F238E27FC236}">
+                <a16:creationId xmlns:a16="http://schemas.microsoft.com/office/drawing/2014/main" id="{186BC588-7BE8-4526-8B80-A08DBE8BBB7F}"/>
+              </a:ext>
+            </a:extLst>
+          </p:cNvPr>
+          <p:cNvCxnSpPr>
+            <a:cxnSpLocks/>
+            <a:stCxn id="67" idx="3"/>
+          </p:cNvCxnSpPr>
+          <p:nvPr/>
+        </p:nvCxnSpPr>
+        <p:spPr>
+          <a:xfrm>
+            <a:off x="5786680" y="2225960"/>
+            <a:ext cx="559651" cy="7476"/>
+          </a:xfrm>
+          <a:prstGeom prst="bentConnector3">
+            <a:avLst/>
+          </a:prstGeom>
+          <a:ln w="19050">
+            <a:solidFill>
+              <a:srgbClr val="7030A0"/>
+            </a:solidFill>
+            <a:headEnd type="none" w="med" len="med"/>
+            <a:tailEnd type="arrow" w="med" len="med"/>
+          </a:ln>
+          <a:effectLst/>
+        </p:spPr>
+        <p:style>
+          <a:lnRef idx="1">
+            <a:schemeClr val="accent2"/>
+          </a:lnRef>
+          <a:fillRef idx="2">
+            <a:schemeClr val="accent2"/>
+          </a:fillRef>
+          <a:effectRef idx="1">
+            <a:schemeClr val="accent2"/>
+          </a:effectRef>
+          <a:fontRef idx="minor">
+            <a:schemeClr val="dk1"/>
+          </a:fontRef>
+        </p:style>
+      </p:cxnSp>
+      <p:sp>
+        <p:nvSpPr>
+          <p:cNvPr id="72" name="Rectangle 8">
+            <a:extLst>
+              <a:ext uri="{FF2B5EF4-FFF2-40B4-BE49-F238E27FC236}">
+                <a16:creationId xmlns:a16="http://schemas.microsoft.com/office/drawing/2014/main" id="{2F08CCA6-535D-4C90-8772-E7717348E67F}"/>
+              </a:ext>
+            </a:extLst>
+          </p:cNvPr>
+          <p:cNvSpPr/>
+          <p:nvPr/>
+        </p:nvSpPr>
+        <p:spPr>
+          <a:xfrm>
+            <a:off x="6313677" y="2121091"/>
+            <a:ext cx="863386" cy="251279"/>
+          </a:xfrm>
+          <a:prstGeom prst="rect">
+            <a:avLst/>
+          </a:prstGeom>
+          <a:ln w="19050">
+            <a:solidFill>
+              <a:srgbClr val="7030A0"/>
+            </a:solidFill>
+          </a:ln>
+          <a:effectLst/>
+        </p:spPr>
+        <p:style>
+          <a:lnRef idx="1">
+            <a:schemeClr val="accent4"/>
+          </a:lnRef>
+          <a:fillRef idx="2">
+            <a:schemeClr val="accent4"/>
+          </a:fillRef>
+          <a:effectRef idx="1">
+            <a:schemeClr val="accent4"/>
+          </a:effectRef>
+          <a:fontRef idx="minor">
+            <a:schemeClr val="dk1"/>
+          </a:fontRef>
+        </p:style>
+        <p:txBody>
+          <a:bodyPr rtlCol="0" anchor="ctr"/>
+          <a:lstStyle/>
+          <a:p>
+            <a:pPr algn="ctr"/>
+            <a:r>
+              <a:rPr lang="en-US" sz="1050" dirty="0" err="1">
+                <a:solidFill>
+                  <a:srgbClr val="7030A0"/>
+                </a:solidFill>
+              </a:rPr>
+              <a:t>EventName</a:t>
+            </a:r>
+            <a:endParaRPr lang="en-SG" sz="1050" dirty="0">
+              <a:solidFill>
+                <a:srgbClr val="7030A0"/>
+              </a:solidFill>
+            </a:endParaRPr>
+          </a:p>
+        </p:txBody>
+      </p:sp>
+      <p:sp>
+        <p:nvSpPr>
+          <p:cNvPr id="73" name="Flowchart: Decision 96">
+            <a:extLst>
+              <a:ext uri="{FF2B5EF4-FFF2-40B4-BE49-F238E27FC236}">
+                <a16:creationId xmlns:a16="http://schemas.microsoft.com/office/drawing/2014/main" id="{848DCFCD-FFB2-4717-A52C-AC920053AC33}"/>
+              </a:ext>
+            </a:extLst>
+          </p:cNvPr>
+          <p:cNvSpPr/>
+          <p:nvPr/>
+        </p:nvSpPr>
+        <p:spPr>
+          <a:xfrm rot="16200000">
+            <a:off x="5142512" y="1853033"/>
+            <a:ext cx="236048" cy="173380"/>
+          </a:xfrm>
+          <a:prstGeom prst="flowChartDecision">
+            <a:avLst/>
+          </a:prstGeom>
+          <a:noFill/>
+          <a:ln w="19050">
+            <a:solidFill>
+              <a:srgbClr val="7030A0"/>
+            </a:solidFill>
+          </a:ln>
+          <a:effectLst/>
+        </p:spPr>
+        <p:style>
+          <a:lnRef idx="1">
+            <a:schemeClr val="accent6"/>
+          </a:lnRef>
+          <a:fillRef idx="2">
+            <a:schemeClr val="accent6"/>
+          </a:fillRef>
+          <a:effectRef idx="1">
+            <a:schemeClr val="accent6"/>
+          </a:effectRef>
+          <a:fontRef idx="minor">
+            <a:schemeClr val="dk1"/>
+          </a:fontRef>
+        </p:style>
+        <p:txBody>
+          <a:bodyPr rtlCol="0" anchor="ctr"/>
+          <a:lstStyle/>
+          <a:p>
+            <a:pPr algn="ctr"/>
+            <a:endParaRPr lang="en-US" sz="1050"/>
+          </a:p>
+        </p:txBody>
+      </p:sp>
+      <p:cxnSp>
+        <p:nvCxnSpPr>
+          <p:cNvPr id="74" name="Elbow Connector 78">
+            <a:extLst>
+              <a:ext uri="{FF2B5EF4-FFF2-40B4-BE49-F238E27FC236}">
+                <a16:creationId xmlns:a16="http://schemas.microsoft.com/office/drawing/2014/main" id="{3F85CCB0-2D9B-4AA5-AE9A-8C62E0DBC7A5}"/>
+              </a:ext>
+            </a:extLst>
+          </p:cNvPr>
+          <p:cNvCxnSpPr>
+            <a:cxnSpLocks/>
+            <a:stCxn id="73" idx="3"/>
+            <a:endCxn id="52" idx="0"/>
+          </p:cNvCxnSpPr>
+          <p:nvPr/>
+        </p:nvCxnSpPr>
+        <p:spPr>
+          <a:xfrm rot="16200000" flipH="1">
+            <a:off x="6459954" y="622281"/>
+            <a:ext cx="407118" cy="2805954"/>
+          </a:xfrm>
+          <a:prstGeom prst="bentConnector3">
+            <a:avLst>
+              <a:gd name="adj1" fmla="val -48454"/>
+            </a:avLst>
+          </a:prstGeom>
+          <a:ln w="19050">
+            <a:solidFill>
+              <a:srgbClr val="7030A0"/>
+            </a:solidFill>
+            <a:headEnd type="none" w="med" len="med"/>
+            <a:tailEnd type="arrow" w="med" len="med"/>
+          </a:ln>
+          <a:effectLst/>
+        </p:spPr>
+        <p:style>
+          <a:lnRef idx="1">
+            <a:schemeClr val="accent2"/>
+          </a:lnRef>
+          <a:fillRef idx="2">
+            <a:schemeClr val="accent2"/>
+          </a:fillRef>
+          <a:effectRef idx="1">
+            <a:schemeClr val="accent2"/>
+          </a:effectRef>
+          <a:fontRef idx="minor">
+            <a:schemeClr val="dk1"/>
+          </a:fontRef>
+        </p:style>
+      </p:cxnSp>
+      <p:sp>
+        <p:nvSpPr>
+          <p:cNvPr id="77" name="TextBox 76">
+            <a:extLst>
+              <a:ext uri="{FF2B5EF4-FFF2-40B4-BE49-F238E27FC236}">
+                <a16:creationId xmlns:a16="http://schemas.microsoft.com/office/drawing/2014/main" id="{CAA98FCC-4F43-4FEF-A5E4-3C04A00627FE}"/>
+              </a:ext>
+            </a:extLst>
+          </p:cNvPr>
+          <p:cNvSpPr txBox="1"/>
+          <p:nvPr/>
+        </p:nvSpPr>
+        <p:spPr>
+          <a:xfrm>
+            <a:off x="4079315" y="2445836"/>
+            <a:ext cx="189257" cy="178683"/>
+          </a:xfrm>
+          <a:prstGeom prst="rect">
+            <a:avLst/>
+          </a:prstGeom>
+          <a:noFill/>
+        </p:spPr>
+        <p:txBody>
+          <a:bodyPr wrap="square" lIns="0" tIns="0" rIns="0" bIns="0" rtlCol="0">
+            <a:noAutofit/>
+          </a:bodyPr>
+          <a:lstStyle/>
+          <a:p>
+            <a:pPr algn="ctr"/>
+            <a:r>
+              <a:rPr lang="en-US" sz="1100" dirty="0">
+                <a:solidFill>
+                  <a:srgbClr val="7030A0"/>
+                </a:solidFill>
+              </a:rPr>
+              <a:t>1</a:t>
+            </a:r>
+            <a:endParaRPr lang="en-SG" sz="1100" dirty="0">
+              <a:solidFill>
+                <a:srgbClr val="7030A0"/>
+              </a:solidFill>
+            </a:endParaRPr>
+          </a:p>
+        </p:txBody>
+      </p:sp>
+      <p:sp>
+        <p:nvSpPr>
+          <p:cNvPr id="82" name="Flowchart: Decision 96">
+            <a:extLst>
+              <a:ext uri="{FF2B5EF4-FFF2-40B4-BE49-F238E27FC236}">
+                <a16:creationId xmlns:a16="http://schemas.microsoft.com/office/drawing/2014/main" id="{C24C5CF6-769A-47AE-AF21-7AF9DE04C8B2}"/>
+              </a:ext>
+            </a:extLst>
+          </p:cNvPr>
+          <p:cNvSpPr/>
+          <p:nvPr/>
+        </p:nvSpPr>
+        <p:spPr>
+          <a:xfrm rot="5400000">
+            <a:off x="4122160" y="2620131"/>
+            <a:ext cx="236048" cy="173380"/>
+          </a:xfrm>
+          <a:prstGeom prst="flowChartDecision">
+            <a:avLst/>
+          </a:prstGeom>
+          <a:solidFill>
+            <a:srgbClr val="7030A0"/>
+          </a:solidFill>
+          <a:ln w="19050">
+            <a:solidFill>
+              <a:srgbClr val="7030A0"/>
+            </a:solidFill>
+          </a:ln>
+          <a:effectLst/>
+        </p:spPr>
+        <p:style>
+          <a:lnRef idx="1">
+            <a:schemeClr val="accent6"/>
+          </a:lnRef>
+          <a:fillRef idx="2">
+            <a:schemeClr val="accent6"/>
+          </a:fillRef>
+          <a:effectRef idx="1">
+            <a:schemeClr val="accent6"/>
+          </a:effectRef>
+          <a:fontRef idx="minor">
+            <a:schemeClr val="dk1"/>
+          </a:fontRef>
+        </p:style>
+        <p:txBody>
+          <a:bodyPr rtlCol="0" anchor="ctr"/>
+          <a:lstStyle/>
+          <a:p>
+            <a:pPr algn="ctr"/>
+            <a:endParaRPr lang="en-US" sz="1050"/>
+          </a:p>
+        </p:txBody>
+      </p:sp>
+      <p:sp>
+        <p:nvSpPr>
+          <p:cNvPr id="87" name="TextBox 86">
+            <a:extLst>
+              <a:ext uri="{FF2B5EF4-FFF2-40B4-BE49-F238E27FC236}">
+                <a16:creationId xmlns:a16="http://schemas.microsoft.com/office/drawing/2014/main" id="{D249F513-D882-41C2-9FE8-609F20A24AD5}"/>
+              </a:ext>
+            </a:extLst>
+          </p:cNvPr>
+          <p:cNvSpPr txBox="1"/>
+          <p:nvPr/>
+        </p:nvSpPr>
+        <p:spPr>
+          <a:xfrm>
+            <a:off x="8054279" y="1951731"/>
+            <a:ext cx="189257" cy="178683"/>
+          </a:xfrm>
+          <a:prstGeom prst="rect">
+            <a:avLst/>
+          </a:prstGeom>
+          <a:noFill/>
+        </p:spPr>
+        <p:txBody>
+          <a:bodyPr wrap="square" lIns="0" tIns="0" rIns="0" bIns="0" rtlCol="0">
+            <a:noAutofit/>
+          </a:bodyPr>
+          <a:lstStyle/>
+          <a:p>
+            <a:pPr algn="ctr"/>
+            <a:r>
+              <a:rPr lang="en-US" sz="1100" dirty="0">
+                <a:solidFill>
+                  <a:srgbClr val="7030A0"/>
+                </a:solidFill>
+              </a:rPr>
+              <a:t>*</a:t>
+            </a:r>
+            <a:endParaRPr lang="en-SG" sz="1100" dirty="0">
+              <a:solidFill>
+                <a:srgbClr val="7030A0"/>
+              </a:solidFill>
+            </a:endParaRPr>
+          </a:p>
+        </p:txBody>
+      </p:sp>
+      <p:sp>
+        <p:nvSpPr>
+          <p:cNvPr id="88" name="TextBox 87">
+            <a:extLst>
+              <a:ext uri="{FF2B5EF4-FFF2-40B4-BE49-F238E27FC236}">
+                <a16:creationId xmlns:a16="http://schemas.microsoft.com/office/drawing/2014/main" id="{6BC9346B-35B4-4094-9735-786E20DDFFF8}"/>
+              </a:ext>
+            </a:extLst>
+          </p:cNvPr>
+          <p:cNvSpPr txBox="1"/>
+          <p:nvPr/>
+        </p:nvSpPr>
+        <p:spPr>
+          <a:xfrm>
+            <a:off x="5764122" y="2229911"/>
+            <a:ext cx="189257" cy="178683"/>
+          </a:xfrm>
+          <a:prstGeom prst="rect">
+            <a:avLst/>
+          </a:prstGeom>
+          <a:noFill/>
+        </p:spPr>
+        <p:txBody>
+          <a:bodyPr wrap="square" lIns="0" tIns="0" rIns="0" bIns="0" rtlCol="0">
+            <a:noAutofit/>
+          </a:bodyPr>
+          <a:lstStyle/>
+          <a:p>
+            <a:pPr algn="ctr"/>
+            <a:r>
+              <a:rPr lang="en-US" sz="1100" dirty="0">
+                <a:solidFill>
+                  <a:srgbClr val="7030A0"/>
+                </a:solidFill>
+              </a:rPr>
+              <a:t>1</a:t>
+            </a:r>
+            <a:endParaRPr lang="en-SG" sz="1100" dirty="0">
+              <a:solidFill>
+                <a:srgbClr val="7030A0"/>
+              </a:solidFill>
+            </a:endParaRPr>
+          </a:p>
+        </p:txBody>
+      </p:sp>
     </p:spTree>
     <p:extLst>
       <p:ext uri="{BB962C8B-B14F-4D97-AF65-F5344CB8AC3E}">

</xml_diff>